<commit_message>
Remove unused master slides
</commit_message>
<xml_diff>
--- a/CastReporting.Reporting/TemplatesFiles/Executive-summary-sample2.pptx
+++ b/CastReporting.Reporting/TemplatesFiles/Executive-summary-sample2.pptx
@@ -6139,647 +6139,6 @@
 </p:sldLayout>
 </file>
 
-<file path=ppt/slideLayouts/slideLayout17.xml><?xml version="1.0" encoding="utf-8"?>
-<p:sldLayout xmlns:a="http://schemas.openxmlformats.org/drawingml/2006/main" xmlns:r="http://schemas.openxmlformats.org/officeDocument/2006/relationships" xmlns:p="http://schemas.openxmlformats.org/presentationml/2006/main" userDrawn="1">
-  <p:cSld name="Title and Content">
-    <p:spTree>
-      <p:nvGrpSpPr>
-        <p:cNvPr id="1" name=""/>
-        <p:cNvGrpSpPr/>
-        <p:nvPr/>
-      </p:nvGrpSpPr>
-      <p:grpSpPr>
-        <a:xfrm>
-          <a:off x="0" y="0"/>
-          <a:ext cx="0" cy="0"/>
-          <a:chOff x="0" y="0"/>
-          <a:chExt cx="0" cy="0"/>
-        </a:xfrm>
-      </p:grpSpPr>
-      <p:sp>
-        <p:nvSpPr>
-          <p:cNvPr id="4" name="Slide Number Placeholder 3"/>
-          <p:cNvSpPr>
-            <a:spLocks noGrp="1"/>
-          </p:cNvSpPr>
-          <p:nvPr>
-            <p:ph type="sldNum" sz="quarter" idx="10"/>
-          </p:nvPr>
-        </p:nvSpPr>
-        <p:spPr/>
-        <p:txBody>
-          <a:bodyPr/>
-          <a:lstStyle>
-            <a:lvl1pPr>
-              <a:defRPr/>
-            </a:lvl1pPr>
-          </a:lstStyle>
-          <a:p>
-            <a:pPr>
-              <a:buClr>
-                <a:prstClr val="black"/>
-              </a:buClr>
-            </a:pPr>
-            <a:fld id="{F71C7896-8E11-4384-BFC5-C0974CDBC83D}" type="slidenum">
-              <a:rPr lang="en-US">
-                <a:solidFill>
-                  <a:srgbClr val="000000">
-                    <a:lumMod val="65000"/>
-                    <a:lumOff val="35000"/>
-                  </a:srgbClr>
-                </a:solidFill>
-              </a:rPr>
-              <a:pPr>
-                <a:buClr>
-                  <a:prstClr val="black"/>
-                </a:buClr>
-              </a:pPr>
-              <a:t>‹#›</a:t>
-            </a:fld>
-            <a:endParaRPr lang="en-US" dirty="0">
-              <a:solidFill>
-                <a:srgbClr val="000000">
-                  <a:lumMod val="65000"/>
-                  <a:lumOff val="35000"/>
-                </a:srgbClr>
-              </a:solidFill>
-            </a:endParaRPr>
-          </a:p>
-        </p:txBody>
-      </p:sp>
-      <p:sp>
-        <p:nvSpPr>
-          <p:cNvPr id="5" name="Title 4"/>
-          <p:cNvSpPr>
-            <a:spLocks noGrp="1"/>
-          </p:cNvSpPr>
-          <p:nvPr>
-            <p:ph type="title"/>
-          </p:nvPr>
-        </p:nvSpPr>
-        <p:spPr/>
-        <p:txBody>
-          <a:bodyPr/>
-          <a:lstStyle/>
-          <a:p>
-            <a:r>
-              <a:rPr lang="en-US"/>
-              <a:t>Click to edit Master title style</a:t>
-            </a:r>
-          </a:p>
-        </p:txBody>
-      </p:sp>
-      <p:sp>
-        <p:nvSpPr>
-          <p:cNvPr id="3" name="Text Placeholder 2"/>
-          <p:cNvSpPr>
-            <a:spLocks noGrp="1"/>
-          </p:cNvSpPr>
-          <p:nvPr>
-            <p:ph type="body" sz="quarter" idx="11"/>
-          </p:nvPr>
-        </p:nvSpPr>
-        <p:spPr>
-          <a:xfrm>
-            <a:off x="433918" y="907126"/>
-            <a:ext cx="11338983" cy="1836400"/>
-          </a:xfrm>
-        </p:spPr>
-        <p:txBody>
-          <a:bodyPr/>
-          <a:lstStyle/>
-          <a:p>
-            <a:pPr lvl="0"/>
-            <a:r>
-              <a:rPr lang="en-US"/>
-              <a:t>Click to edit Master text styles</a:t>
-            </a:r>
-          </a:p>
-          <a:p>
-            <a:pPr lvl="1"/>
-            <a:r>
-              <a:rPr lang="en-US"/>
-              <a:t>Second level</a:t>
-            </a:r>
-          </a:p>
-          <a:p>
-            <a:pPr lvl="2"/>
-            <a:r>
-              <a:rPr lang="en-US"/>
-              <a:t>Third level</a:t>
-            </a:r>
-          </a:p>
-          <a:p>
-            <a:pPr lvl="3"/>
-            <a:r>
-              <a:rPr lang="en-US"/>
-              <a:t>Fourth level</a:t>
-            </a:r>
-          </a:p>
-          <a:p>
-            <a:pPr lvl="4"/>
-            <a:r>
-              <a:rPr lang="en-US"/>
-              <a:t>Fifth level</a:t>
-            </a:r>
-            <a:endParaRPr lang="en-US" dirty="0"/>
-          </a:p>
-        </p:txBody>
-      </p:sp>
-    </p:spTree>
-    <p:extLst>
-      <p:ext uri="{BB962C8B-B14F-4D97-AF65-F5344CB8AC3E}">
-        <p14:creationId xmlns:p14="http://schemas.microsoft.com/office/powerpoint/2010/main" val="2351733687"/>
-      </p:ext>
-    </p:extLst>
-  </p:cSld>
-  <p:clrMapOvr>
-    <a:masterClrMapping/>
-  </p:clrMapOvr>
-</p:sldLayout>
-</file>
-
-<file path=ppt/slideLayouts/slideLayout18.xml><?xml version="1.0" encoding="utf-8"?>
-<p:sldLayout xmlns:a="http://schemas.openxmlformats.org/drawingml/2006/main" xmlns:r="http://schemas.openxmlformats.org/officeDocument/2006/relationships" xmlns:p="http://schemas.openxmlformats.org/presentationml/2006/main" showMasterSp="0" type="title">
-  <p:cSld name="Title Slide">
-    <p:bg>
-      <p:bgPr>
-        <a:solidFill>
-          <a:schemeClr val="bg1"/>
-        </a:solidFill>
-        <a:effectLst/>
-      </p:bgPr>
-    </p:bg>
-    <p:spTree>
-      <p:nvGrpSpPr>
-        <p:cNvPr id="1" name=""/>
-        <p:cNvGrpSpPr/>
-        <p:nvPr/>
-      </p:nvGrpSpPr>
-      <p:grpSpPr>
-        <a:xfrm>
-          <a:off x="0" y="0"/>
-          <a:ext cx="0" cy="0"/>
-          <a:chOff x="0" y="0"/>
-          <a:chExt cx="0" cy="0"/>
-        </a:xfrm>
-      </p:grpSpPr>
-      <p:grpSp>
-        <p:nvGrpSpPr>
-          <p:cNvPr id="4" name="Group 3"/>
-          <p:cNvGrpSpPr/>
-          <p:nvPr userDrawn="1"/>
-        </p:nvGrpSpPr>
-        <p:grpSpPr>
-          <a:xfrm>
-            <a:off x="0" y="0"/>
-            <a:ext cx="12192000" cy="6736360"/>
-            <a:chOff x="0" y="0"/>
-            <a:chExt cx="9144000" cy="6736360"/>
-          </a:xfrm>
-        </p:grpSpPr>
-        <p:grpSp>
-          <p:nvGrpSpPr>
-            <p:cNvPr id="5" name="Group 4"/>
-            <p:cNvGrpSpPr/>
-            <p:nvPr userDrawn="1"/>
-          </p:nvGrpSpPr>
-          <p:grpSpPr>
-            <a:xfrm>
-              <a:off x="0" y="0"/>
-              <a:ext cx="9144000" cy="6736360"/>
-              <a:chOff x="0" y="0"/>
-              <a:chExt cx="9144000" cy="6736360"/>
-            </a:xfrm>
-          </p:grpSpPr>
-          <p:grpSp>
-            <p:nvGrpSpPr>
-              <p:cNvPr id="7" name="Group 6"/>
-              <p:cNvGrpSpPr/>
-              <p:nvPr userDrawn="1"/>
-            </p:nvGrpSpPr>
-            <p:grpSpPr>
-              <a:xfrm>
-                <a:off x="0" y="0"/>
-                <a:ext cx="9144000" cy="6736360"/>
-                <a:chOff x="0" y="0"/>
-                <a:chExt cx="9144000" cy="6736360"/>
-              </a:xfrm>
-            </p:grpSpPr>
-            <p:pic>
-              <p:nvPicPr>
-                <p:cNvPr id="9" name="Picture 8"/>
-                <p:cNvPicPr>
-                  <a:picLocks noChangeAspect="1"/>
-                </p:cNvPicPr>
-                <p:nvPr userDrawn="1"/>
-              </p:nvPicPr>
-              <p:blipFill rotWithShape="1">
-                <a:blip r:embed="rId2" cstate="screen">
-                  <a:extLst>
-                    <a:ext uri="{28A0092B-C50C-407E-A947-70E740481C1C}">
-                      <a14:useLocalDpi xmlns:a14="http://schemas.microsoft.com/office/drawing/2010/main" val="0"/>
-                    </a:ext>
-                  </a:extLst>
-                </a:blip>
-                <a:srcRect/>
-                <a:stretch/>
-              </p:blipFill>
-              <p:spPr>
-                <a:xfrm>
-                  <a:off x="0" y="0"/>
-                  <a:ext cx="9144000" cy="6736360"/>
-                </a:xfrm>
-                <a:prstGeom prst="rect">
-                  <a:avLst/>
-                </a:prstGeom>
-              </p:spPr>
-            </p:pic>
-            <p:sp>
-              <p:nvSpPr>
-                <p:cNvPr id="10" name="Rectangle 9"/>
-                <p:cNvSpPr/>
-                <p:nvPr userDrawn="1"/>
-              </p:nvSpPr>
-              <p:spPr bwMode="auto">
-                <a:xfrm>
-                  <a:off x="5603846" y="629174"/>
-                  <a:ext cx="3254928" cy="763398"/>
-                </a:xfrm>
-                <a:prstGeom prst="rect">
-                  <a:avLst/>
-                </a:prstGeom>
-                <a:solidFill>
-                  <a:schemeClr val="bg1"/>
-                </a:solidFill>
-                <a:ln w="9525" cap="flat" cmpd="sng" algn="ctr">
-                  <a:noFill/>
-                  <a:prstDash val="solid"/>
-                  <a:miter lim="800000"/>
-                  <a:headEnd type="none" w="med" len="med"/>
-                  <a:tailEnd type="none" w="med" len="med"/>
-                </a:ln>
-                <a:effectLst/>
-              </p:spPr>
-              <p:txBody>
-                <a:bodyPr vert="horz" wrap="none" lIns="91440" tIns="45720" rIns="91440" bIns="45720" numCol="1" rtlCol="0" anchor="t" anchorCtr="0" compatLnSpc="1">
-                  <a:prstTxWarp prst="textNoShape">
-                    <a:avLst/>
-                  </a:prstTxWarp>
-                </a:bodyPr>
-                <a:lstStyle/>
-                <a:p>
-                  <a:endParaRPr lang="en-US" sz="2400" dirty="0">
-                    <a:solidFill>
-                      <a:prstClr val="black"/>
-                    </a:solidFill>
-                    <a:latin typeface="Times New Roman" pitchFamily="18" charset="0"/>
-                    <a:cs typeface="+mn-cs"/>
-                  </a:endParaRPr>
-                </a:p>
-              </p:txBody>
-            </p:sp>
-          </p:grpSp>
-          <p:pic>
-            <p:nvPicPr>
-              <p:cNvPr id="8" name="Picture 7" descr="Cover_Cast_IceBerg_3-JSP9.jpg"/>
-              <p:cNvPicPr>
-                <a:picLocks noChangeAspect="1"/>
-              </p:cNvPicPr>
-              <p:nvPr userDrawn="1"/>
-            </p:nvPicPr>
-            <p:blipFill>
-              <a:blip r:embed="rId3" cstate="screen">
-                <a:extLst>
-                  <a:ext uri="{BEBA8EAE-BF5A-486C-A8C5-ECC9F3942E4B}">
-                    <a14:imgProps xmlns:a14="http://schemas.microsoft.com/office/drawing/2010/main">
-                      <a14:imgLayer r:embed="rId4">
-                        <a14:imgEffect>
-                          <a14:sharpenSoften amount="25000"/>
-                        </a14:imgEffect>
-                      </a14:imgLayer>
-                    </a14:imgProps>
-                  </a:ext>
-                </a:extLst>
-              </a:blip>
-              <a:srcRect/>
-              <a:stretch>
-                <a:fillRect/>
-              </a:stretch>
-            </p:blipFill>
-            <p:spPr>
-              <a:xfrm>
-                <a:off x="0" y="1524000"/>
-                <a:ext cx="9144000" cy="3048000"/>
-              </a:xfrm>
-              <a:prstGeom prst="rect">
-                <a:avLst/>
-              </a:prstGeom>
-            </p:spPr>
-          </p:pic>
-        </p:grpSp>
-        <p:pic>
-          <p:nvPicPr>
-            <p:cNvPr id="6" name="Picture 5" descr="CAST_grey_100_bl.jpg"/>
-            <p:cNvPicPr>
-              <a:picLocks noChangeAspect="1"/>
-            </p:cNvPicPr>
-            <p:nvPr userDrawn="1"/>
-          </p:nvPicPr>
-          <p:blipFill>
-            <a:blip r:embed="rId5" cstate="screen"/>
-            <a:stretch>
-              <a:fillRect/>
-            </a:stretch>
-          </p:blipFill>
-          <p:spPr>
-            <a:xfrm>
-              <a:off x="5791726" y="457200"/>
-              <a:ext cx="2818874" cy="548640"/>
-            </a:xfrm>
-            <a:prstGeom prst="rect">
-              <a:avLst/>
-            </a:prstGeom>
-          </p:spPr>
-        </p:pic>
-      </p:grpSp>
-      <p:sp>
-        <p:nvSpPr>
-          <p:cNvPr id="200706" name="Rectangle 2"/>
-          <p:cNvSpPr>
-            <a:spLocks noGrp="1" noChangeArrowheads="1"/>
-          </p:cNvSpPr>
-          <p:nvPr>
-            <p:ph type="subTitle" idx="1"/>
-          </p:nvPr>
-        </p:nvSpPr>
-        <p:spPr>
-          <a:xfrm>
-            <a:off x="609600" y="5477259"/>
-            <a:ext cx="10972800" cy="353943"/>
-          </a:xfrm>
-          <a:prstGeom prst="rect">
-            <a:avLst/>
-          </a:prstGeom>
-        </p:spPr>
-        <p:txBody>
-          <a:bodyPr vert="horz" lIns="45720" tIns="45720" rIns="45720" bIns="0" rtlCol="0">
-            <a:spAutoFit/>
-          </a:bodyPr>
-          <a:lstStyle>
-            <a:lvl1pPr marL="0" indent="0">
-              <a:buNone/>
-              <a:defRPr lang="en-US" sz="2000" b="0" i="0" dirty="0">
-                <a:solidFill>
-                  <a:schemeClr val="accent2"/>
-                </a:solidFill>
-              </a:defRPr>
-            </a:lvl1pPr>
-          </a:lstStyle>
-          <a:p>
-            <a:pPr lvl="0">
-              <a:tabLst>
-                <a:tab pos="1025525" algn="l"/>
-              </a:tabLst>
-            </a:pPr>
-            <a:r>
-              <a:rPr lang="en-US"/>
-              <a:t>Click to edit Master subtitle style</a:t>
-            </a:r>
-            <a:endParaRPr lang="en-US" dirty="0"/>
-          </a:p>
-        </p:txBody>
-      </p:sp>
-      <p:sp>
-        <p:nvSpPr>
-          <p:cNvPr id="200707" name="Rectangle 3"/>
-          <p:cNvSpPr>
-            <a:spLocks noGrp="1" noChangeArrowheads="1"/>
-          </p:cNvSpPr>
-          <p:nvPr>
-            <p:ph type="ctrTitle" sz="quarter"/>
-          </p:nvPr>
-        </p:nvSpPr>
-        <p:spPr>
-          <a:xfrm>
-            <a:off x="621792" y="5034686"/>
-            <a:ext cx="10972800" cy="378565"/>
-          </a:xfrm>
-          <a:noFill/>
-          <a:ln w="9525">
-            <a:noFill/>
-            <a:miter lim="800000"/>
-            <a:headEnd/>
-            <a:tailEnd/>
-          </a:ln>
-          <a:effectLst/>
-        </p:spPr>
-        <p:txBody>
-          <a:bodyPr vert="horz" wrap="square" lIns="45720" tIns="45720" rIns="45720" bIns="0" numCol="1" anchor="b" anchorCtr="0" compatLnSpc="1">
-            <a:prstTxWarp prst="textNoShape">
-              <a:avLst/>
-            </a:prstTxWarp>
-          </a:bodyPr>
-          <a:lstStyle>
-            <a:lvl1pPr>
-              <a:defRPr lang="en-US" sz="2400" b="1" dirty="0"/>
-            </a:lvl1pPr>
-          </a:lstStyle>
-          <a:p>
-            <a:pPr lvl="0"/>
-            <a:r>
-              <a:rPr lang="en-US"/>
-              <a:t>Click to edit Master title style</a:t>
-            </a:r>
-            <a:endParaRPr lang="en-US" dirty="0"/>
-          </a:p>
-        </p:txBody>
-      </p:sp>
-    </p:spTree>
-    <p:extLst>
-      <p:ext uri="{BB962C8B-B14F-4D97-AF65-F5344CB8AC3E}">
-        <p14:creationId xmlns:p14="http://schemas.microsoft.com/office/powerpoint/2010/main" val="2524143590"/>
-      </p:ext>
-    </p:extLst>
-  </p:cSld>
-  <p:clrMapOvr>
-    <a:masterClrMapping/>
-  </p:clrMapOvr>
-</p:sldLayout>
-</file>
-
-<file path=ppt/slideLayouts/slideLayout19.xml><?xml version="1.0" encoding="utf-8"?>
-<p:sldLayout xmlns:a="http://schemas.openxmlformats.org/drawingml/2006/main" xmlns:r="http://schemas.openxmlformats.org/officeDocument/2006/relationships" xmlns:p="http://schemas.openxmlformats.org/presentationml/2006/main" type="obj">
-  <p:cSld name="1_Title and Content">
-    <p:spTree>
-      <p:nvGrpSpPr>
-        <p:cNvPr id="1" name=""/>
-        <p:cNvGrpSpPr/>
-        <p:nvPr/>
-      </p:nvGrpSpPr>
-      <p:grpSpPr>
-        <a:xfrm>
-          <a:off x="0" y="0"/>
-          <a:ext cx="0" cy="0"/>
-          <a:chOff x="0" y="0"/>
-          <a:chExt cx="0" cy="0"/>
-        </a:xfrm>
-      </p:grpSpPr>
-      <p:sp>
-        <p:nvSpPr>
-          <p:cNvPr id="2" name="Title 1"/>
-          <p:cNvSpPr>
-            <a:spLocks noGrp="1"/>
-          </p:cNvSpPr>
-          <p:nvPr>
-            <p:ph type="title"/>
-          </p:nvPr>
-        </p:nvSpPr>
-        <p:spPr/>
-        <p:txBody>
-          <a:bodyPr/>
-          <a:lstStyle/>
-          <a:p>
-            <a:r>
-              <a:rPr lang="en-US"/>
-              <a:t>Click to edit Master title style</a:t>
-            </a:r>
-            <a:endParaRPr lang="fr-FR"/>
-          </a:p>
-        </p:txBody>
-      </p:sp>
-      <p:sp>
-        <p:nvSpPr>
-          <p:cNvPr id="3" name="Content Placeholder 2"/>
-          <p:cNvSpPr>
-            <a:spLocks noGrp="1"/>
-          </p:cNvSpPr>
-          <p:nvPr>
-            <p:ph idx="1"/>
-          </p:nvPr>
-        </p:nvSpPr>
-        <p:spPr/>
-        <p:txBody>
-          <a:bodyPr/>
-          <a:lstStyle/>
-          <a:p>
-            <a:pPr lvl="0"/>
-            <a:r>
-              <a:rPr lang="en-US"/>
-              <a:t>Click to edit Master text styles</a:t>
-            </a:r>
-          </a:p>
-          <a:p>
-            <a:pPr lvl="1"/>
-            <a:r>
-              <a:rPr lang="en-US"/>
-              <a:t>Second level</a:t>
-            </a:r>
-          </a:p>
-          <a:p>
-            <a:pPr lvl="2"/>
-            <a:r>
-              <a:rPr lang="en-US"/>
-              <a:t>Third level</a:t>
-            </a:r>
-          </a:p>
-          <a:p>
-            <a:pPr lvl="3"/>
-            <a:r>
-              <a:rPr lang="en-US"/>
-              <a:t>Fourth level</a:t>
-            </a:r>
-          </a:p>
-          <a:p>
-            <a:pPr lvl="4"/>
-            <a:r>
-              <a:rPr lang="en-US"/>
-              <a:t>Fifth level</a:t>
-            </a:r>
-            <a:endParaRPr lang="fr-FR"/>
-          </a:p>
-        </p:txBody>
-      </p:sp>
-      <p:sp>
-        <p:nvSpPr>
-          <p:cNvPr id="4" name="Date Placeholder 3"/>
-          <p:cNvSpPr>
-            <a:spLocks noGrp="1"/>
-          </p:cNvSpPr>
-          <p:nvPr>
-            <p:ph type="dt" sz="half" idx="10"/>
-          </p:nvPr>
-        </p:nvSpPr>
-        <p:spPr/>
-        <p:txBody>
-          <a:bodyPr/>
-          <a:lstStyle/>
-          <a:p>
-            <a:fld id="{D8E3BBD6-5DF7-411E-B793-6A3558CCCDCA}" type="datetimeFigureOut">
-              <a:rPr lang="fr-FR" smtClean="0"/>
-              <a:pPr/>
-              <a:t>27/08/2018</a:t>
-            </a:fld>
-            <a:endParaRPr lang="fr-FR"/>
-          </a:p>
-        </p:txBody>
-      </p:sp>
-      <p:sp>
-        <p:nvSpPr>
-          <p:cNvPr id="5" name="Footer Placeholder 4"/>
-          <p:cNvSpPr>
-            <a:spLocks noGrp="1"/>
-          </p:cNvSpPr>
-          <p:nvPr>
-            <p:ph type="ftr" sz="quarter" idx="11"/>
-          </p:nvPr>
-        </p:nvSpPr>
-        <p:spPr/>
-        <p:txBody>
-          <a:bodyPr/>
-          <a:lstStyle/>
-          <a:p>
-            <a:endParaRPr lang="fr-FR"/>
-          </a:p>
-        </p:txBody>
-      </p:sp>
-      <p:sp>
-        <p:nvSpPr>
-          <p:cNvPr id="6" name="Slide Number Placeholder 5"/>
-          <p:cNvSpPr>
-            <a:spLocks noGrp="1"/>
-          </p:cNvSpPr>
-          <p:nvPr>
-            <p:ph type="sldNum" sz="quarter" idx="12"/>
-          </p:nvPr>
-        </p:nvSpPr>
-        <p:spPr/>
-        <p:txBody>
-          <a:bodyPr/>
-          <a:lstStyle/>
-          <a:p>
-            <a:fld id="{D112F321-ADE0-4CA9-90EE-BE719C325C6C}" type="slidenum">
-              <a:rPr lang="fr-FR" smtClean="0"/>
-              <a:pPr/>
-              <a:t>‹#›</a:t>
-            </a:fld>
-            <a:endParaRPr lang="fr-FR"/>
-          </a:p>
-        </p:txBody>
-      </p:sp>
-    </p:spTree>
-    <p:extLst>
-      <p:ext uri="{BB962C8B-B14F-4D97-AF65-F5344CB8AC3E}">
-        <p14:creationId xmlns:p14="http://schemas.microsoft.com/office/powerpoint/2010/main" val="1191855048"/>
-      </p:ext>
-    </p:extLst>
-  </p:cSld>
-  <p:clrMapOvr>
-    <a:masterClrMapping/>
-  </p:clrMapOvr>
-</p:sldLayout>
-</file>
-
 <file path=ppt/slideLayouts/slideLayout2.xml><?xml version="1.0" encoding="utf-8"?>
 <p:sldLayout xmlns:a="http://schemas.openxmlformats.org/drawingml/2006/main" xmlns:r="http://schemas.openxmlformats.org/officeDocument/2006/relationships" xmlns:p="http://schemas.openxmlformats.org/presentationml/2006/main" preserve="1" userDrawn="1">
   <p:cSld name="Title - Entreprise">
@@ -10367,9 +9726,6 @@
     <p:sldLayoutId id="2147483719" r:id="rId14"/>
     <p:sldLayoutId id="2147483720" r:id="rId15"/>
     <p:sldLayoutId id="2147483721" r:id="rId16"/>
-    <p:sldLayoutId id="2147483722" r:id="rId17"/>
-    <p:sldLayoutId id="2147483723" r:id="rId18"/>
-    <p:sldLayoutId id="2147483724" r:id="rId19"/>
   </p:sldLayoutIdLst>
   <p:hf hdr="0" ftr="0" dt="0"/>
   <p:txStyles>

</xml_diff>